<commit_message>
Updated notebook and presentation
</commit_message>
<xml_diff>
--- a/HELP International -Analysis.pptx
+++ b/HELP International -Analysis.pptx
@@ -128,6 +128,11 @@
       </a:defRPr>
     </a:lvl9pPr>
   </p:defaultTextStyle>
+  <p:extLst>
+    <p:ext uri="{EFAFB233-063F-42B5-8137-9DF3F51BA10A}">
+      <p15:sldGuideLst xmlns:p15="http://schemas.microsoft.com/office/powerpoint/2012/main"/>
+    </p:ext>
+  </p:extLst>
 </p:presentation>
 </file>
 
@@ -853,7 +858,7 @@
           <a:p>
             <a:fld id="{4FE1BFE5-CAD4-420F-8C70-C5542A951920}" type="datetimeFigureOut">
               <a:rPr lang="en-US" smtClean="0"/>
-              <a:t>1/1/2021</a:t>
+              <a:t>1/31/2021</a:t>
             </a:fld>
             <a:endParaRPr lang="en-US"/>
           </a:p>
@@ -1104,7 +1109,7 @@
           <a:p>
             <a:fld id="{4FE1BFE5-CAD4-420F-8C70-C5542A951920}" type="datetimeFigureOut">
               <a:rPr lang="en-US" smtClean="0"/>
-              <a:t>1/1/2021</a:t>
+              <a:t>1/31/2021</a:t>
             </a:fld>
             <a:endParaRPr lang="en-US"/>
           </a:p>
@@ -1418,7 +1423,7 @@
           <a:p>
             <a:fld id="{4FE1BFE5-CAD4-420F-8C70-C5542A951920}" type="datetimeFigureOut">
               <a:rPr lang="en-US" smtClean="0"/>
-              <a:t>1/1/2021</a:t>
+              <a:t>1/31/2021</a:t>
             </a:fld>
             <a:endParaRPr lang="en-US"/>
           </a:p>
@@ -1759,7 +1764,7 @@
           <a:p>
             <a:fld id="{4FE1BFE5-CAD4-420F-8C70-C5542A951920}" type="datetimeFigureOut">
               <a:rPr lang="en-US" smtClean="0"/>
-              <a:t>1/1/2021</a:t>
+              <a:t>1/31/2021</a:t>
             </a:fld>
             <a:endParaRPr lang="en-US"/>
           </a:p>
@@ -2073,7 +2078,7 @@
           <a:p>
             <a:fld id="{4FE1BFE5-CAD4-420F-8C70-C5542A951920}" type="datetimeFigureOut">
               <a:rPr lang="en-US" smtClean="0"/>
-              <a:t>1/1/2021</a:t>
+              <a:t>1/31/2021</a:t>
             </a:fld>
             <a:endParaRPr lang="en-US"/>
           </a:p>
@@ -2466,7 +2471,7 @@
           <a:p>
             <a:fld id="{4FE1BFE5-CAD4-420F-8C70-C5542A951920}" type="datetimeFigureOut">
               <a:rPr lang="en-US" smtClean="0"/>
-              <a:t>1/1/2021</a:t>
+              <a:t>1/31/2021</a:t>
             </a:fld>
             <a:endParaRPr lang="en-US"/>
           </a:p>
@@ -2636,7 +2641,7 @@
           <a:p>
             <a:fld id="{4FE1BFE5-CAD4-420F-8C70-C5542A951920}" type="datetimeFigureOut">
               <a:rPr lang="en-US" smtClean="0"/>
-              <a:t>1/1/2021</a:t>
+              <a:t>1/31/2021</a:t>
             </a:fld>
             <a:endParaRPr lang="en-US"/>
           </a:p>
@@ -2816,7 +2821,7 @@
           <a:p>
             <a:fld id="{4FE1BFE5-CAD4-420F-8C70-C5542A951920}" type="datetimeFigureOut">
               <a:rPr lang="en-US" smtClean="0"/>
-              <a:t>1/1/2021</a:t>
+              <a:t>1/31/2021</a:t>
             </a:fld>
             <a:endParaRPr lang="en-US"/>
           </a:p>
@@ -2992,7 +2997,7 @@
           <a:p>
             <a:fld id="{4FE1BFE5-CAD4-420F-8C70-C5542A951920}" type="datetimeFigureOut">
               <a:rPr lang="en-US" smtClean="0"/>
-              <a:t>1/1/2021</a:t>
+              <a:t>1/31/2021</a:t>
             </a:fld>
             <a:endParaRPr lang="en-US"/>
           </a:p>
@@ -3239,7 +3244,7 @@
           <a:p>
             <a:fld id="{4FE1BFE5-CAD4-420F-8C70-C5542A951920}" type="datetimeFigureOut">
               <a:rPr lang="en-US" smtClean="0"/>
-              <a:t>1/1/2021</a:t>
+              <a:t>1/31/2021</a:t>
             </a:fld>
             <a:endParaRPr lang="en-US"/>
           </a:p>
@@ -3471,7 +3476,7 @@
           <a:p>
             <a:fld id="{4FE1BFE5-CAD4-420F-8C70-C5542A951920}" type="datetimeFigureOut">
               <a:rPr lang="en-US" smtClean="0"/>
-              <a:t>1/1/2021</a:t>
+              <a:t>1/31/2021</a:t>
             </a:fld>
             <a:endParaRPr lang="en-US"/>
           </a:p>
@@ -3845,7 +3850,7 @@
           <a:p>
             <a:fld id="{4FE1BFE5-CAD4-420F-8C70-C5542A951920}" type="datetimeFigureOut">
               <a:rPr lang="en-US" smtClean="0"/>
-              <a:t>1/1/2021</a:t>
+              <a:t>1/31/2021</a:t>
             </a:fld>
             <a:endParaRPr lang="en-US"/>
           </a:p>
@@ -3968,7 +3973,7 @@
           <a:p>
             <a:fld id="{4FE1BFE5-CAD4-420F-8C70-C5542A951920}" type="datetimeFigureOut">
               <a:rPr lang="en-US" smtClean="0"/>
-              <a:t>1/1/2021</a:t>
+              <a:t>1/31/2021</a:t>
             </a:fld>
             <a:endParaRPr lang="en-US"/>
           </a:p>
@@ -4063,7 +4068,7 @@
           <a:p>
             <a:fld id="{4FE1BFE5-CAD4-420F-8C70-C5542A951920}" type="datetimeFigureOut">
               <a:rPr lang="en-US" smtClean="0"/>
-              <a:t>1/1/2021</a:t>
+              <a:t>1/31/2021</a:t>
             </a:fld>
             <a:endParaRPr lang="en-US"/>
           </a:p>
@@ -4318,7 +4323,7 @@
           <a:p>
             <a:fld id="{4FE1BFE5-CAD4-420F-8C70-C5542A951920}" type="datetimeFigureOut">
               <a:rPr lang="en-US" smtClean="0"/>
-              <a:t>1/1/2021</a:t>
+              <a:t>1/31/2021</a:t>
             </a:fld>
             <a:endParaRPr lang="en-US"/>
           </a:p>
@@ -4581,7 +4586,7 @@
           <a:p>
             <a:fld id="{4FE1BFE5-CAD4-420F-8C70-C5542A951920}" type="datetimeFigureOut">
               <a:rPr lang="en-US" smtClean="0"/>
-              <a:t>1/1/2021</a:t>
+              <a:t>1/31/2021</a:t>
             </a:fld>
             <a:endParaRPr lang="en-US"/>
           </a:p>
@@ -5324,7 +5329,7 @@
           <a:p>
             <a:fld id="{4FE1BFE5-CAD4-420F-8C70-C5542A951920}" type="datetimeFigureOut">
               <a:rPr lang="en-US" smtClean="0"/>
-              <a:t>1/1/2021</a:t>
+              <a:t>1/31/2021</a:t>
             </a:fld>
             <a:endParaRPr lang="en-US"/>
           </a:p>
@@ -5911,8 +5916,8 @@
         </p:nvSpPr>
         <p:spPr>
           <a:xfrm>
-            <a:off x="289334" y="346230"/>
-            <a:ext cx="3750006" cy="954107"/>
+            <a:off x="355107" y="346230"/>
+            <a:ext cx="7688062" cy="1077218"/>
           </a:xfrm>
           <a:prstGeom prst="rect">
             <a:avLst/>
@@ -5926,7 +5931,7 @@
           <a:lstStyle/>
           <a:p>
             <a:r>
-              <a:rPr lang="en-US" sz="2800" b="0" cap="none" spc="0" dirty="0">
+              <a:rPr lang="en-US" sz="3200" b="0" cap="none" spc="0" dirty="0">
                 <a:ln w="0"/>
                 <a:solidFill>
                   <a:schemeClr val="tx1"/>
@@ -5944,7 +5949,7 @@
           </a:p>
           <a:p>
             <a:r>
-              <a:rPr lang="en-US" sz="2800" b="0" cap="none" spc="0" dirty="0">
+              <a:rPr lang="en-US" sz="3200" b="0" cap="none" spc="0" dirty="0">
                 <a:ln w="0"/>
                 <a:solidFill>
                   <a:schemeClr val="tx1"/>
@@ -7585,8 +7590,8 @@
           </a:p>
         </p:txBody>
       </p:sp>
-      <mc:AlternateContent xmlns:mc="http://schemas.openxmlformats.org/markup-compatibility/2006">
-        <mc:Choice xmlns:a14="http://schemas.microsoft.com/office/drawing/2010/main" Requires="a14">
+      <mc:AlternateContent xmlns:mc="http://schemas.openxmlformats.org/markup-compatibility/2006" xmlns:a14="http://schemas.microsoft.com/office/drawing/2010/main">
+        <mc:Choice Requires="a14">
           <p:sp>
             <p:nvSpPr>
               <p:cNvPr id="3" name="TextBox 2">
@@ -7615,6 +7620,7 @@
               </a:bodyPr>
               <a:lstStyle/>
               <a:p>
+                <a:pPr/>
                 <a14:m>
                   <m:oMathPara xmlns:m="http://schemas.openxmlformats.org/officeDocument/2006/math">
                     <m:oMathParaPr>
@@ -7734,7 +7740,7 @@
             </p:txBody>
           </p:sp>
         </mc:Choice>
-        <mc:Fallback>
+        <mc:Fallback xmlns="">
           <p:sp>
             <p:nvSpPr>
               <p:cNvPr id="3" name="TextBox 2">

</xml_diff>